<commit_message>
Atualizacao de Slides e Exemplos
</commit_message>
<xml_diff>
--- a/TECNOLOGIAS PARA INTERNET II/SLIDES/TI-2_Aula_04.pptx
+++ b/TECNOLOGIAS PARA INTERNET II/SLIDES/TI-2_Aula_04.pptx
@@ -5,10 +5,10 @@
     <p:sldMasterId id="2147483725" r:id="rId1"/>
   </p:sldMasterIdLst>
   <p:notesMasterIdLst>
-    <p:notesMasterId r:id="rId17"/>
+    <p:notesMasterId r:id="rId18"/>
   </p:notesMasterIdLst>
   <p:handoutMasterIdLst>
-    <p:handoutMasterId r:id="rId18"/>
+    <p:handoutMasterId r:id="rId19"/>
   </p:handoutMasterIdLst>
   <p:sldIdLst>
     <p:sldId id="256" r:id="rId2"/>
@@ -19,13 +19,14 @@
     <p:sldId id="519" r:id="rId7"/>
     <p:sldId id="521" r:id="rId8"/>
     <p:sldId id="522" r:id="rId9"/>
-    <p:sldId id="523" r:id="rId10"/>
-    <p:sldId id="506" r:id="rId11"/>
-    <p:sldId id="516" r:id="rId12"/>
-    <p:sldId id="517" r:id="rId13"/>
-    <p:sldId id="505" r:id="rId14"/>
-    <p:sldId id="518" r:id="rId15"/>
-    <p:sldId id="524" r:id="rId16"/>
+    <p:sldId id="525" r:id="rId10"/>
+    <p:sldId id="523" r:id="rId11"/>
+    <p:sldId id="506" r:id="rId12"/>
+    <p:sldId id="516" r:id="rId13"/>
+    <p:sldId id="517" r:id="rId14"/>
+    <p:sldId id="505" r:id="rId15"/>
+    <p:sldId id="518" r:id="rId16"/>
+    <p:sldId id="524" r:id="rId17"/>
   </p:sldIdLst>
   <p:sldSz cx="12192000" cy="6858000"/>
   <p:notesSz cx="9144000" cy="6858000"/>
@@ -226,7 +227,7 @@
           <a:p>
             <a:fld id="{0D6042A3-0B4D-4B7E-B5DF-C74B5157F851}" type="datetimeFigureOut">
               <a:rPr lang="pt-BR" smtClean="0"/>
-              <a:t>10/09/2018</a:t>
+              <a:t>17/09/2018</a:t>
             </a:fld>
             <a:endParaRPr lang="pt-BR"/>
           </a:p>
@@ -403,7 +404,7 @@
           <a:p>
             <a:fld id="{C8D94D05-F877-4447-A135-C5020AC71E43}" type="datetimeFigureOut">
               <a:rPr lang="pt-BR" smtClean="0"/>
-              <a:t>10/09/2018</a:t>
+              <a:t>17/09/2018</a:t>
             </a:fld>
             <a:endParaRPr lang="pt-BR"/>
           </a:p>
@@ -1494,6 +1495,117 @@
     </p:spTree>
     <p:extLst>
       <p:ext uri="{BB962C8B-B14F-4D97-AF65-F5344CB8AC3E}">
+        <p14:creationId xmlns:p14="http://schemas.microsoft.com/office/powerpoint/2010/main" val="2196022978"/>
+      </p:ext>
+    </p:extLst>
+  </p:cSld>
+  <p:clrMapOvr>
+    <a:masterClrMapping/>
+  </p:clrMapOvr>
+</p:notes>
+</file>
+
+<file path=ppt/notesSlides/notesSlide9.xml><?xml version="1.0" encoding="utf-8"?>
+<p:notes xmlns:a="http://schemas.openxmlformats.org/drawingml/2006/main" xmlns:r="http://schemas.openxmlformats.org/officeDocument/2006/relationships" xmlns:p="http://schemas.openxmlformats.org/presentationml/2006/main">
+  <p:cSld>
+    <p:spTree>
+      <p:nvGrpSpPr>
+        <p:cNvPr id="1" name=""/>
+        <p:cNvGrpSpPr/>
+        <p:nvPr/>
+      </p:nvGrpSpPr>
+      <p:grpSpPr>
+        <a:xfrm>
+          <a:off x="0" y="0"/>
+          <a:ext cx="0" cy="0"/>
+          <a:chOff x="0" y="0"/>
+          <a:chExt cx="0" cy="0"/>
+        </a:xfrm>
+      </p:grpSpPr>
+      <p:sp>
+        <p:nvSpPr>
+          <p:cNvPr id="4" name="Rectangle 8">
+            <a:extLst>
+              <a:ext uri="{FF2B5EF4-FFF2-40B4-BE49-F238E27FC236}">
+                <a16:creationId xmlns:a16="http://schemas.microsoft.com/office/drawing/2014/main" id="{8042CB19-B3F1-4F4D-909A-647BD612000D}"/>
+              </a:ext>
+            </a:extLst>
+          </p:cNvPr>
+          <p:cNvSpPr>
+            <a:spLocks noGrp="1" noChangeArrowheads="1"/>
+          </p:cNvSpPr>
+          <p:nvPr>
+            <p:ph type="sldNum" sz="quarter" idx="5"/>
+          </p:nvPr>
+        </p:nvSpPr>
+        <p:spPr>
+          <a:ln/>
+        </p:spPr>
+        <p:txBody>
+          <a:bodyPr/>
+          <a:lstStyle/>
+          <a:p>
+            <a:fld id="{8D4C700F-416C-44D6-BABB-FF6CDEBD4D71}" type="slidenum">
+              <a:rPr lang="es-ES_tradnl" altLang="pt-BR"/>
+              <a:pPr/>
+              <a:t>10</a:t>
+            </a:fld>
+            <a:endParaRPr lang="es-ES_tradnl" altLang="pt-BR"/>
+          </a:p>
+        </p:txBody>
+      </p:sp>
+      <p:sp>
+        <p:nvSpPr>
+          <p:cNvPr id="305154" name="Rectangle 2">
+            <a:extLst>
+              <a:ext uri="{FF2B5EF4-FFF2-40B4-BE49-F238E27FC236}">
+                <a16:creationId xmlns:a16="http://schemas.microsoft.com/office/drawing/2014/main" id="{E64554E1-3676-40B2-B414-352F515B84FC}"/>
+              </a:ext>
+            </a:extLst>
+          </p:cNvPr>
+          <p:cNvSpPr>
+            <a:spLocks noGrp="1" noRot="1" noChangeAspect="1" noChangeArrowheads="1" noTextEdit="1"/>
+          </p:cNvSpPr>
+          <p:nvPr>
+            <p:ph type="sldImg"/>
+          </p:nvPr>
+        </p:nvSpPr>
+        <p:spPr>
+          <a:xfrm>
+            <a:off x="869950" y="762000"/>
+            <a:ext cx="5040313" cy="2836863"/>
+          </a:xfrm>
+          <a:ln/>
+        </p:spPr>
+      </p:sp>
+      <p:sp>
+        <p:nvSpPr>
+          <p:cNvPr id="305155" name="Rectangle 3">
+            <a:extLst>
+              <a:ext uri="{FF2B5EF4-FFF2-40B4-BE49-F238E27FC236}">
+                <a16:creationId xmlns:a16="http://schemas.microsoft.com/office/drawing/2014/main" id="{D4F5EC93-74A7-4292-969D-5D78DD9F82CD}"/>
+              </a:ext>
+            </a:extLst>
+          </p:cNvPr>
+          <p:cNvSpPr>
+            <a:spLocks noGrp="1" noChangeArrowheads="1"/>
+          </p:cNvSpPr>
+          <p:nvPr>
+            <p:ph type="body" idx="1"/>
+          </p:nvPr>
+        </p:nvSpPr>
+        <p:spPr/>
+        <p:txBody>
+          <a:bodyPr/>
+          <a:lstStyle/>
+          <a:p>
+            <a:endParaRPr lang="es-ES_tradnl" altLang="pt-BR"/>
+          </a:p>
+        </p:txBody>
+      </p:sp>
+    </p:spTree>
+    <p:extLst>
+      <p:ext uri="{BB962C8B-B14F-4D97-AF65-F5344CB8AC3E}">
         <p14:creationId xmlns:p14="http://schemas.microsoft.com/office/powerpoint/2010/main" val="1205852884"/>
       </p:ext>
     </p:extLst>
@@ -1646,7 +1758,7 @@
           <a:p>
             <a:fld id="{DDA311FA-82EF-42D6-8BA2-B5028F90DB2F}" type="datetime1">
               <a:rPr lang="pt-BR" smtClean="0"/>
-              <a:t>10/09/2018</a:t>
+              <a:t>17/09/2018</a:t>
             </a:fld>
             <a:endParaRPr lang="pt-BR"/>
           </a:p>
@@ -1820,7 +1932,7 @@
           <a:p>
             <a:fld id="{8BB151B1-8487-4414-A1E2-2A9A855BB90A}" type="datetime1">
               <a:rPr lang="pt-BR" smtClean="0"/>
-              <a:t>10/09/2018</a:t>
+              <a:t>17/09/2018</a:t>
             </a:fld>
             <a:endParaRPr lang="pt-BR"/>
           </a:p>
@@ -2003,7 +2115,7 @@
           <a:p>
             <a:fld id="{DCF529DE-280C-4EC9-B77D-1798208A1480}" type="datetime1">
               <a:rPr lang="pt-BR" smtClean="0"/>
-              <a:t>10/09/2018</a:t>
+              <a:t>17/09/2018</a:t>
             </a:fld>
             <a:endParaRPr lang="pt-BR"/>
           </a:p>
@@ -2176,7 +2288,7 @@
           <a:p>
             <a:fld id="{DFC0EABB-52F3-42B2-AA22-8F4450C20CFE}" type="datetime1">
               <a:rPr lang="pt-BR" smtClean="0"/>
-              <a:t>10/09/2018</a:t>
+              <a:t>17/09/2018</a:t>
             </a:fld>
             <a:endParaRPr lang="pt-BR"/>
           </a:p>
@@ -2431,7 +2543,7 @@
           <a:p>
             <a:fld id="{A0FA48D1-CE44-4314-BA7F-E5E194EA42A2}" type="datetime1">
               <a:rPr lang="pt-BR" smtClean="0"/>
-              <a:t>10/09/2018</a:t>
+              <a:t>17/09/2018</a:t>
             </a:fld>
             <a:endParaRPr lang="pt-BR"/>
           </a:p>
@@ -2667,7 +2779,7 @@
           <a:p>
             <a:fld id="{EEF545AF-4C23-4E31-AACE-3DEB1D1D41D0}" type="datetime1">
               <a:rPr lang="pt-BR" smtClean="0"/>
-              <a:t>10/09/2018</a:t>
+              <a:t>17/09/2018</a:t>
             </a:fld>
             <a:endParaRPr lang="pt-BR"/>
           </a:p>
@@ -3018,7 +3130,7 @@
           <a:p>
             <a:fld id="{AE20F753-E421-4B36-AD36-AD23BA1BDA27}" type="datetime1">
               <a:rPr lang="pt-BR" smtClean="0"/>
-              <a:t>10/09/2018</a:t>
+              <a:t>17/09/2018</a:t>
             </a:fld>
             <a:endParaRPr lang="pt-BR"/>
           </a:p>
@@ -3140,7 +3252,7 @@
           <a:p>
             <a:fld id="{DD4BCC76-8174-4D19-96CE-4132C189C455}" type="datetime1">
               <a:rPr lang="pt-BR" smtClean="0"/>
-              <a:t>10/09/2018</a:t>
+              <a:t>17/09/2018</a:t>
             </a:fld>
             <a:endParaRPr lang="pt-BR"/>
           </a:p>
@@ -3262,7 +3374,7 @@
           <a:p>
             <a:fld id="{A7243320-67A1-405F-9534-AA4F204A5176}" type="datetime1">
               <a:rPr lang="pt-BR" smtClean="0"/>
-              <a:t>10/09/2018</a:t>
+              <a:t>17/09/2018</a:t>
             </a:fld>
             <a:endParaRPr lang="pt-BR"/>
           </a:p>
@@ -3549,7 +3661,7 @@
           <a:p>
             <a:fld id="{482A4476-8DCA-4F22-9B3E-2415738BEF45}" type="datetime1">
               <a:rPr lang="pt-BR" smtClean="0"/>
-              <a:t>10/09/2018</a:t>
+              <a:t>17/09/2018</a:t>
             </a:fld>
             <a:endParaRPr lang="pt-BR"/>
           </a:p>
@@ -3816,7 +3928,7 @@
           <a:p>
             <a:fld id="{CDFA6B25-55FF-41C9-8DBB-00354B6F6A8E}" type="datetime1">
               <a:rPr lang="pt-BR" smtClean="0"/>
-              <a:t>10/09/2018</a:t>
+              <a:t>17/09/2018</a:t>
             </a:fld>
             <a:endParaRPr lang="pt-BR"/>
           </a:p>
@@ -4033,7 +4145,7 @@
           <a:p>
             <a:fld id="{1F64BC04-CFE1-4E67-ABE4-C17F7F3E20EF}" type="datetime1">
               <a:rPr lang="pt-BR" smtClean="0"/>
-              <a:t>10/09/2018</a:t>
+              <a:t>17/09/2018</a:t>
             </a:fld>
             <a:endParaRPr lang="pt-BR"/>
           </a:p>
@@ -4734,6 +4846,426 @@
       </p:grpSpPr>
       <p:sp>
         <p:nvSpPr>
+          <p:cNvPr id="304130" name="Rectangle 2">
+            <a:extLst>
+              <a:ext uri="{FF2B5EF4-FFF2-40B4-BE49-F238E27FC236}">
+                <a16:creationId xmlns:a16="http://schemas.microsoft.com/office/drawing/2014/main" id="{7B505F29-54B3-4564-BF6A-A857020D55D5}"/>
+              </a:ext>
+            </a:extLst>
+          </p:cNvPr>
+          <p:cNvSpPr>
+            <a:spLocks noGrp="1" noChangeArrowheads="1"/>
+          </p:cNvSpPr>
+          <p:nvPr>
+            <p:ph type="title"/>
+          </p:nvPr>
+        </p:nvSpPr>
+        <p:spPr>
+          <a:xfrm>
+            <a:off x="838200" y="85103"/>
+            <a:ext cx="10515600" cy="1325562"/>
+          </a:xfrm>
+        </p:spPr>
+        <p:txBody>
+          <a:bodyPr>
+            <a:normAutofit/>
+          </a:bodyPr>
+          <a:lstStyle/>
+          <a:p>
+            <a:r>
+              <a:rPr lang="en-US" b="1" i="1" dirty="0">
+                <a:solidFill>
+                  <a:srgbClr val="6600FF"/>
+                </a:solidFill>
+                <a:effectLst>
+                  <a:outerShdw blurRad="38100" dist="38100" dir="2700000" algn="tl">
+                    <a:srgbClr val="000000">
+                      <a:alpha val="43137"/>
+                    </a:srgbClr>
+                  </a:outerShdw>
+                </a:effectLst>
+              </a:rPr>
+              <a:t>TECNOLOGIAS PARA INTERNET - II</a:t>
+            </a:r>
+            <a:br>
+              <a:rPr lang="en-US" dirty="0"/>
+            </a:br>
+            <a:r>
+              <a:rPr lang="en-US" dirty="0">
+                <a:solidFill>
+                  <a:srgbClr val="6600FF"/>
+                </a:solidFill>
+              </a:rPr>
+              <a:t>PHP</a:t>
+            </a:r>
+            <a:r>
+              <a:rPr lang="en-US" dirty="0"/>
+              <a:t> – </a:t>
+            </a:r>
+            <a:r>
+              <a:rPr lang="en-US" dirty="0" err="1"/>
+              <a:t>Variáveis</a:t>
+            </a:r>
+            <a:r>
+              <a:rPr lang="en-US" dirty="0"/>
+              <a:t> </a:t>
+            </a:r>
+            <a:r>
+              <a:rPr lang="en-US" dirty="0" err="1"/>
+              <a:t>Especiais</a:t>
+            </a:r>
+            <a:endParaRPr lang="es-ES_tradnl" altLang="pt-BR" dirty="0"/>
+          </a:p>
+        </p:txBody>
+      </p:sp>
+      <p:sp>
+        <p:nvSpPr>
+          <p:cNvPr id="4" name="Espaço Reservado para Data 3">
+            <a:extLst>
+              <a:ext uri="{FF2B5EF4-FFF2-40B4-BE49-F238E27FC236}">
+                <a16:creationId xmlns:a16="http://schemas.microsoft.com/office/drawing/2014/main" id="{AA878FC1-C5B7-4669-95D3-2A90BF62AADD}"/>
+              </a:ext>
+            </a:extLst>
+          </p:cNvPr>
+          <p:cNvSpPr>
+            <a:spLocks noGrp="1"/>
+          </p:cNvSpPr>
+          <p:nvPr>
+            <p:ph type="dt" sz="half" idx="10"/>
+          </p:nvPr>
+        </p:nvSpPr>
+        <p:spPr/>
+        <p:txBody>
+          <a:bodyPr/>
+          <a:lstStyle/>
+          <a:p>
+            <a:fld id="{3D79C721-C921-4175-8BCF-DFF9FE942864}" type="datetime1">
+              <a:rPr lang="pt-BR" smtClean="0"/>
+              <a:t>17/09/2018</a:t>
+            </a:fld>
+            <a:endParaRPr lang="pt-BR"/>
+          </a:p>
+        </p:txBody>
+      </p:sp>
+      <p:sp>
+        <p:nvSpPr>
+          <p:cNvPr id="5" name="Espaço Reservado para Rodapé 4">
+            <a:extLst>
+              <a:ext uri="{FF2B5EF4-FFF2-40B4-BE49-F238E27FC236}">
+                <a16:creationId xmlns:a16="http://schemas.microsoft.com/office/drawing/2014/main" id="{6373A092-48F0-490B-B7FA-0A8BF66DF19D}"/>
+              </a:ext>
+            </a:extLst>
+          </p:cNvPr>
+          <p:cNvSpPr>
+            <a:spLocks noGrp="1"/>
+          </p:cNvSpPr>
+          <p:nvPr>
+            <p:ph type="ftr" sz="quarter" idx="11"/>
+          </p:nvPr>
+        </p:nvSpPr>
+        <p:spPr/>
+        <p:txBody>
+          <a:bodyPr/>
+          <a:lstStyle/>
+          <a:p>
+            <a:r>
+              <a:rPr lang="pt-BR" dirty="0"/>
+              <a:t>Tecnologias para Internet - II  -  Prof.  André L. Braga</a:t>
+            </a:r>
+          </a:p>
+        </p:txBody>
+      </p:sp>
+      <p:sp>
+        <p:nvSpPr>
+          <p:cNvPr id="6" name="Espaço Reservado para Número de Slide 5">
+            <a:extLst>
+              <a:ext uri="{FF2B5EF4-FFF2-40B4-BE49-F238E27FC236}">
+                <a16:creationId xmlns:a16="http://schemas.microsoft.com/office/drawing/2014/main" id="{9E9B8146-1BA5-482E-A510-1C368A2D7C6F}"/>
+              </a:ext>
+            </a:extLst>
+          </p:cNvPr>
+          <p:cNvSpPr>
+            <a:spLocks noGrp="1"/>
+          </p:cNvSpPr>
+          <p:nvPr>
+            <p:ph type="sldNum" sz="quarter" idx="12"/>
+          </p:nvPr>
+        </p:nvSpPr>
+        <p:spPr/>
+        <p:txBody>
+          <a:bodyPr/>
+          <a:lstStyle/>
+          <a:p>
+            <a:fld id="{733E8BE4-D61F-4D52-A9A4-24AB47FC0B80}" type="slidenum">
+              <a:rPr lang="pt-BR" smtClean="0"/>
+              <a:t>10</a:t>
+            </a:fld>
+            <a:endParaRPr lang="pt-BR"/>
+          </a:p>
+        </p:txBody>
+      </p:sp>
+      <p:sp>
+        <p:nvSpPr>
+          <p:cNvPr id="9" name="Retângulo 8">
+            <a:extLst>
+              <a:ext uri="{FF2B5EF4-FFF2-40B4-BE49-F238E27FC236}">
+                <a16:creationId xmlns:a16="http://schemas.microsoft.com/office/drawing/2014/main" id="{2366A8E9-A3D1-4BA4-A454-08A66B073726}"/>
+              </a:ext>
+            </a:extLst>
+          </p:cNvPr>
+          <p:cNvSpPr/>
+          <p:nvPr/>
+        </p:nvSpPr>
+        <p:spPr>
+          <a:xfrm>
+            <a:off x="642938" y="1328962"/>
+            <a:ext cx="11044238" cy="4401205"/>
+          </a:xfrm>
+          <a:prstGeom prst="rect">
+            <a:avLst/>
+          </a:prstGeom>
+        </p:spPr>
+        <p:txBody>
+          <a:bodyPr wrap="square">
+            <a:spAutoFit/>
+          </a:bodyPr>
+          <a:lstStyle/>
+          <a:p>
+            <a:pPr marL="285750" indent="-285750">
+              <a:buFont typeface="Arial" panose="020B0604020202020204" pitchFamily="34" charset="0"/>
+              <a:buChar char="•"/>
+            </a:pPr>
+            <a:r>
+              <a:rPr lang="en-US" sz="3200" b="1" dirty="0"/>
+              <a:t>$_GET</a:t>
+            </a:r>
+          </a:p>
+          <a:p>
+            <a:pPr lvl="1"/>
+            <a:r>
+              <a:rPr lang="en-US" sz="2400" b="1" dirty="0">
+                <a:solidFill>
+                  <a:srgbClr val="6600FF"/>
+                </a:solidFill>
+                <a:latin typeface="Courier New" panose="02070309020205020404" pitchFamily="49" charset="0"/>
+                <a:cs typeface="Courier New" panose="02070309020205020404" pitchFamily="49" charset="0"/>
+              </a:rPr>
+              <a:t>&lt;?php</a:t>
+            </a:r>
+          </a:p>
+          <a:p>
+            <a:pPr lvl="1"/>
+            <a:r>
+              <a:rPr lang="en-US" sz="2400" b="1" dirty="0">
+                <a:latin typeface="Courier New" panose="02070309020205020404" pitchFamily="49" charset="0"/>
+                <a:cs typeface="Courier New" panose="02070309020205020404" pitchFamily="49" charset="0"/>
+              </a:rPr>
+              <a:t>   $</a:t>
+            </a:r>
+            <a:r>
+              <a:rPr lang="en-US" sz="2400" b="1" dirty="0" err="1">
+                <a:latin typeface="Courier New" panose="02070309020205020404" pitchFamily="49" charset="0"/>
+                <a:cs typeface="Courier New" panose="02070309020205020404" pitchFamily="49" charset="0"/>
+              </a:rPr>
+              <a:t>nomeFuncionario</a:t>
+            </a:r>
+            <a:r>
+              <a:rPr lang="en-US" sz="2400" b="1" dirty="0">
+                <a:latin typeface="Courier New" panose="02070309020205020404" pitchFamily="49" charset="0"/>
+                <a:cs typeface="Courier New" panose="02070309020205020404" pitchFamily="49" charset="0"/>
+              </a:rPr>
+              <a:t> </a:t>
+            </a:r>
+            <a:r>
+              <a:rPr lang="en-US" sz="2400" b="1" dirty="0">
+                <a:solidFill>
+                  <a:srgbClr val="6600FF"/>
+                </a:solidFill>
+                <a:latin typeface="Courier New" panose="02070309020205020404" pitchFamily="49" charset="0"/>
+                <a:cs typeface="Courier New" panose="02070309020205020404" pitchFamily="49" charset="0"/>
+              </a:rPr>
+              <a:t>= $_GET[“NOMEFUNC”];</a:t>
+            </a:r>
+          </a:p>
+          <a:p>
+            <a:pPr lvl="1"/>
+            <a:r>
+              <a:rPr lang="en-US" sz="2400" b="1" dirty="0">
+                <a:solidFill>
+                  <a:srgbClr val="6600FF"/>
+                </a:solidFill>
+                <a:latin typeface="Courier New" panose="02070309020205020404" pitchFamily="49" charset="0"/>
+                <a:cs typeface="Courier New" panose="02070309020205020404" pitchFamily="49" charset="0"/>
+              </a:rPr>
+              <a:t>?&gt;</a:t>
+            </a:r>
+            <a:endParaRPr lang="pt-BR" sz="2400" dirty="0">
+              <a:latin typeface="Courier New" panose="02070309020205020404" pitchFamily="49" charset="0"/>
+              <a:cs typeface="Courier New" panose="02070309020205020404" pitchFamily="49" charset="0"/>
+            </a:endParaRPr>
+          </a:p>
+          <a:p>
+            <a:r>
+              <a:rPr lang="en-US" sz="2400" dirty="0">
+                <a:latin typeface="Courier New" panose="02070309020205020404" pitchFamily="49" charset="0"/>
+                <a:cs typeface="Courier New" panose="02070309020205020404" pitchFamily="49" charset="0"/>
+              </a:rPr>
+              <a:t>	Ex:  </a:t>
+            </a:r>
+            <a:r>
+              <a:rPr lang="en-US" sz="2400" dirty="0">
+                <a:latin typeface="Courier New" panose="02070309020205020404" pitchFamily="49" charset="0"/>
+                <a:cs typeface="Courier New" panose="02070309020205020404" pitchFamily="49" charset="0"/>
+                <a:hlinkClick r:id="rId3"/>
+              </a:rPr>
+              <a:t>http://localhost/tste.php?</a:t>
+            </a:r>
+            <a:r>
+              <a:rPr lang="en-US" sz="2400" b="1" dirty="0">
+                <a:solidFill>
+                  <a:srgbClr val="6600FF"/>
+                </a:solidFill>
+                <a:latin typeface="Courier New" panose="02070309020205020404" pitchFamily="49" charset="0"/>
+                <a:cs typeface="Courier New" panose="02070309020205020404" pitchFamily="49" charset="0"/>
+                <a:hlinkClick r:id="rId3"/>
+              </a:rPr>
+              <a:t>NOMEFUNC</a:t>
+            </a:r>
+            <a:r>
+              <a:rPr lang="en-US" sz="2400" dirty="0">
+                <a:latin typeface="Courier New" panose="02070309020205020404" pitchFamily="49" charset="0"/>
+                <a:cs typeface="Courier New" panose="02070309020205020404" pitchFamily="49" charset="0"/>
+                <a:hlinkClick r:id="rId3"/>
+              </a:rPr>
+              <a:t>=Andre</a:t>
+            </a:r>
+            <a:endParaRPr lang="en-US" sz="2400" dirty="0">
+              <a:latin typeface="Courier New" panose="02070309020205020404" pitchFamily="49" charset="0"/>
+              <a:cs typeface="Courier New" panose="02070309020205020404" pitchFamily="49" charset="0"/>
+            </a:endParaRPr>
+          </a:p>
+          <a:p>
+            <a:endParaRPr lang="en-US" sz="2400" dirty="0">
+              <a:latin typeface="Courier New" panose="02070309020205020404" pitchFamily="49" charset="0"/>
+              <a:cs typeface="Courier New" panose="02070309020205020404" pitchFamily="49" charset="0"/>
+            </a:endParaRPr>
+          </a:p>
+          <a:p>
+            <a:pPr marL="285750" indent="-285750">
+              <a:buFont typeface="Arial" panose="020B0604020202020204" pitchFamily="34" charset="0"/>
+              <a:buChar char="•"/>
+            </a:pPr>
+            <a:r>
+              <a:rPr lang="en-US" sz="3200" b="1" dirty="0"/>
+              <a:t>$_POST </a:t>
+            </a:r>
+            <a:r>
+              <a:rPr lang="en-US" sz="3200" dirty="0"/>
+              <a:t>– </a:t>
+            </a:r>
+            <a:r>
+              <a:rPr lang="en-US" sz="3200" dirty="0" err="1"/>
+              <a:t>Usado</a:t>
+            </a:r>
+            <a:r>
+              <a:rPr lang="en-US" sz="3200" dirty="0"/>
+              <a:t> com </a:t>
+            </a:r>
+            <a:r>
+              <a:rPr lang="en-US" sz="3200" dirty="0" err="1"/>
+              <a:t>chamadas</a:t>
+            </a:r>
+            <a:r>
+              <a:rPr lang="en-US" sz="3200" dirty="0"/>
+              <a:t> “POST”</a:t>
+            </a:r>
+          </a:p>
+          <a:p>
+            <a:pPr marL="285750" indent="-285750">
+              <a:buFont typeface="Arial" panose="020B0604020202020204" pitchFamily="34" charset="0"/>
+              <a:buChar char="•"/>
+            </a:pPr>
+            <a:endParaRPr lang="en-US" sz="3200" dirty="0"/>
+          </a:p>
+          <a:p>
+            <a:pPr marL="285750" indent="-285750">
+              <a:buFont typeface="Arial" panose="020B0604020202020204" pitchFamily="34" charset="0"/>
+              <a:buChar char="•"/>
+            </a:pPr>
+            <a:r>
+              <a:rPr lang="en-US" sz="3200" b="1" dirty="0"/>
+              <a:t>$_REQUEST </a:t>
+            </a:r>
+            <a:r>
+              <a:rPr lang="en-US" sz="3200" dirty="0"/>
+              <a:t>– </a:t>
+            </a:r>
+            <a:r>
+              <a:rPr lang="en-US" sz="3200" dirty="0" err="1"/>
+              <a:t>Usado</a:t>
+            </a:r>
+            <a:r>
+              <a:rPr lang="en-US" sz="3200" dirty="0"/>
+              <a:t> para </a:t>
+            </a:r>
+            <a:r>
+              <a:rPr lang="en-US" sz="3200" dirty="0" err="1"/>
+              <a:t>ambas</a:t>
+            </a:r>
+            <a:r>
+              <a:rPr lang="en-US" sz="3200" dirty="0"/>
+              <a:t> as </a:t>
+            </a:r>
+            <a:r>
+              <a:rPr lang="en-US" sz="3200" dirty="0" err="1"/>
+              <a:t>chamadas</a:t>
+            </a:r>
+            <a:endParaRPr lang="en-US" sz="3200" dirty="0"/>
+          </a:p>
+          <a:p>
+            <a:pPr marL="285750" indent="-285750">
+              <a:buFont typeface="Arial" panose="020B0604020202020204" pitchFamily="34" charset="0"/>
+              <a:buChar char="•"/>
+            </a:pPr>
+            <a:endParaRPr lang="en-US" sz="3200" b="1" dirty="0"/>
+          </a:p>
+        </p:txBody>
+      </p:sp>
+    </p:spTree>
+    <p:extLst>
+      <p:ext uri="{BB962C8B-B14F-4D97-AF65-F5344CB8AC3E}">
+        <p14:creationId xmlns:p14="http://schemas.microsoft.com/office/powerpoint/2010/main" val="2157290014"/>
+      </p:ext>
+    </p:extLst>
+  </p:cSld>
+  <p:clrMapOvr>
+    <a:masterClrMapping/>
+  </p:clrMapOvr>
+  <p:transition spd="med">
+    <p:strips dir="rd"/>
+  </p:transition>
+</p:sld>
+</file>
+
+<file path=ppt/slides/slide11.xml><?xml version="1.0" encoding="utf-8"?>
+<p:sld xmlns:a="http://schemas.openxmlformats.org/drawingml/2006/main" xmlns:r="http://schemas.openxmlformats.org/officeDocument/2006/relationships" xmlns:p="http://schemas.openxmlformats.org/presentationml/2006/main">
+  <p:cSld>
+    <p:spTree>
+      <p:nvGrpSpPr>
+        <p:cNvPr id="1" name=""/>
+        <p:cNvGrpSpPr/>
+        <p:nvPr/>
+      </p:nvGrpSpPr>
+      <p:grpSpPr>
+        <a:xfrm>
+          <a:off x="0" y="0"/>
+          <a:ext cx="0" cy="0"/>
+          <a:chOff x="0" y="0"/>
+          <a:chExt cx="0" cy="0"/>
+        </a:xfrm>
+      </p:grpSpPr>
+      <p:sp>
+        <p:nvSpPr>
           <p:cNvPr id="9218" name="Rectangle 2">
             <a:extLst>
               <a:ext uri="{FF2B5EF4-FFF2-40B4-BE49-F238E27FC236}">
@@ -4816,7 +5348,7 @@
           <a:p>
             <a:fld id="{9BF740CF-2981-4F5F-94B0-87A76F3E9898}" type="datetime1">
               <a:rPr lang="pt-BR" smtClean="0"/>
-              <a:t>10/09/2018</a:t>
+              <a:t>17/09/2018</a:t>
             </a:fld>
             <a:endParaRPr lang="pt-BR"/>
           </a:p>
@@ -4874,7 +5406,7 @@
           <a:p>
             <a:fld id="{733E8BE4-D61F-4D52-A9A4-24AB47FC0B80}" type="slidenum">
               <a:rPr lang="pt-BR" smtClean="0"/>
-              <a:t>10</a:t>
+              <a:t>11</a:t>
             </a:fld>
             <a:endParaRPr lang="pt-BR"/>
           </a:p>
@@ -5085,7 +5617,7 @@
 </p:sld>
 </file>
 
-<file path=ppt/slides/slide11.xml><?xml version="1.0" encoding="utf-8"?>
+<file path=ppt/slides/slide12.xml><?xml version="1.0" encoding="utf-8"?>
 <p:sld xmlns:a="http://schemas.openxmlformats.org/drawingml/2006/main" xmlns:r="http://schemas.openxmlformats.org/officeDocument/2006/relationships" xmlns:p="http://schemas.openxmlformats.org/presentationml/2006/main">
   <p:cSld>
     <p:spTree>
@@ -5180,7 +5712,7 @@
           <a:p>
             <a:fld id="{DBE3F080-9489-48C3-8C8B-7461F9A59375}" type="datetime1">
               <a:rPr lang="pt-BR" smtClean="0"/>
-              <a:t>10/09/2018</a:t>
+              <a:t>17/09/2018</a:t>
             </a:fld>
             <a:endParaRPr lang="pt-BR"/>
           </a:p>
@@ -5238,7 +5770,7 @@
           <a:p>
             <a:fld id="{733E8BE4-D61F-4D52-A9A4-24AB47FC0B80}" type="slidenum">
               <a:rPr lang="pt-BR" smtClean="0"/>
-              <a:t>11</a:t>
+              <a:t>12</a:t>
             </a:fld>
             <a:endParaRPr lang="pt-BR"/>
           </a:p>
@@ -5528,7 +6060,7 @@
 </p:sld>
 </file>
 
-<file path=ppt/slides/slide12.xml><?xml version="1.0" encoding="utf-8"?>
+<file path=ppt/slides/slide13.xml><?xml version="1.0" encoding="utf-8"?>
 <p:sld xmlns:a="http://schemas.openxmlformats.org/drawingml/2006/main" xmlns:r="http://schemas.openxmlformats.org/officeDocument/2006/relationships" xmlns:p="http://schemas.openxmlformats.org/presentationml/2006/main">
   <p:cSld>
     <p:spTree>
@@ -5615,7 +6147,7 @@
           <a:p>
             <a:fld id="{E3B02374-FA94-4124-BA4C-CB5D574F166F}" type="datetime1">
               <a:rPr lang="pt-BR" smtClean="0"/>
-              <a:t>10/09/2018</a:t>
+              <a:t>17/09/2018</a:t>
             </a:fld>
             <a:endParaRPr lang="pt-BR"/>
           </a:p>
@@ -5673,7 +6205,7 @@
           <a:p>
             <a:fld id="{733E8BE4-D61F-4D52-A9A4-24AB47FC0B80}" type="slidenum">
               <a:rPr lang="pt-BR" smtClean="0"/>
-              <a:t>12</a:t>
+              <a:t>13</a:t>
             </a:fld>
             <a:endParaRPr lang="pt-BR"/>
           </a:p>
@@ -5838,7 +6370,7 @@
 </p:sld>
 </file>
 
-<file path=ppt/slides/slide13.xml><?xml version="1.0" encoding="utf-8"?>
+<file path=ppt/slides/slide14.xml><?xml version="1.0" encoding="utf-8"?>
 <p:sld xmlns:a="http://schemas.openxmlformats.org/drawingml/2006/main" xmlns:r="http://schemas.openxmlformats.org/officeDocument/2006/relationships" xmlns:p="http://schemas.openxmlformats.org/presentationml/2006/main">
   <p:cSld>
     <p:spTree>
@@ -5927,7 +6459,7 @@
           <a:p>
             <a:fld id="{48D6FA67-25B5-4660-8F94-9B7A19016346}" type="datetime1">
               <a:rPr lang="pt-BR" smtClean="0"/>
-              <a:t>10/09/2018</a:t>
+              <a:t>17/09/2018</a:t>
             </a:fld>
             <a:endParaRPr lang="pt-BR"/>
           </a:p>
@@ -5985,7 +6517,7 @@
           <a:p>
             <a:fld id="{733E8BE4-D61F-4D52-A9A4-24AB47FC0B80}" type="slidenum">
               <a:rPr lang="pt-BR" smtClean="0"/>
-              <a:t>13</a:t>
+              <a:t>14</a:t>
             </a:fld>
             <a:endParaRPr lang="pt-BR"/>
           </a:p>
@@ -6236,7 +6768,7 @@
 </p:sld>
 </file>
 
-<file path=ppt/slides/slide14.xml><?xml version="1.0" encoding="utf-8"?>
+<file path=ppt/slides/slide15.xml><?xml version="1.0" encoding="utf-8"?>
 <p:sld xmlns:a="http://schemas.openxmlformats.org/drawingml/2006/main" xmlns:r="http://schemas.openxmlformats.org/officeDocument/2006/relationships" xmlns:p="http://schemas.openxmlformats.org/presentationml/2006/main">
   <p:cSld>
     <p:spTree>
@@ -6330,7 +6862,7 @@
           <a:p>
             <a:fld id="{F84C0D72-50EC-4B83-B4C5-44366C9CE1BD}" type="datetime1">
               <a:rPr lang="pt-BR" smtClean="0"/>
-              <a:t>10/09/2018</a:t>
+              <a:t>17/09/2018</a:t>
             </a:fld>
             <a:endParaRPr lang="pt-BR"/>
           </a:p>
@@ -6388,7 +6920,7 @@
           <a:p>
             <a:fld id="{733E8BE4-D61F-4D52-A9A4-24AB47FC0B80}" type="slidenum">
               <a:rPr lang="pt-BR" smtClean="0"/>
-              <a:t>14</a:t>
+              <a:t>15</a:t>
             </a:fld>
             <a:endParaRPr lang="pt-BR"/>
           </a:p>
@@ -6601,7 +7133,7 @@
 </p:sld>
 </file>
 
-<file path=ppt/slides/slide15.xml><?xml version="1.0" encoding="utf-8"?>
+<file path=ppt/slides/slide16.xml><?xml version="1.0" encoding="utf-8"?>
 <p:sld xmlns:a="http://schemas.openxmlformats.org/drawingml/2006/main" xmlns:r="http://schemas.openxmlformats.org/officeDocument/2006/relationships" xmlns:p="http://schemas.openxmlformats.org/presentationml/2006/main">
   <p:cSld>
     <p:spTree>
@@ -6735,7 +7267,7 @@
           <a:p>
             <a:fld id="{F84C0D72-50EC-4B83-B4C5-44366C9CE1BD}" type="datetime1">
               <a:rPr lang="pt-BR" smtClean="0"/>
-              <a:t>10/09/2018</a:t>
+              <a:t>17/09/2018</a:t>
             </a:fld>
             <a:endParaRPr lang="pt-BR"/>
           </a:p>
@@ -6793,7 +7325,7 @@
           <a:p>
             <a:fld id="{733E8BE4-D61F-4D52-A9A4-24AB47FC0B80}" type="slidenum">
               <a:rPr lang="pt-BR" smtClean="0"/>
-              <a:t>15</a:t>
+              <a:t>16</a:t>
             </a:fld>
             <a:endParaRPr lang="pt-BR"/>
           </a:p>
@@ -7160,7 +7692,7 @@
           <a:p>
             <a:fld id="{66ED4467-497E-46D3-8F02-B62F1B068136}" type="datetime1">
               <a:rPr lang="pt-BR" smtClean="0"/>
-              <a:t>10/09/2018</a:t>
+              <a:t>17/09/2018</a:t>
             </a:fld>
             <a:endParaRPr lang="pt-BR"/>
           </a:p>
@@ -9891,7 +10423,7 @@
           <a:p>
             <a:fld id="{3D79C721-C921-4175-8BCF-DFF9FE942864}" type="datetime1">
               <a:rPr lang="pt-BR" smtClean="0"/>
-              <a:t>10/09/2018</a:t>
+              <a:t>17/09/2018</a:t>
             </a:fld>
             <a:endParaRPr lang="pt-BR"/>
           </a:p>
@@ -10418,7 +10950,7 @@
           <a:p>
             <a:fld id="{3D79C721-C921-4175-8BCF-DFF9FE942864}" type="datetime1">
               <a:rPr lang="pt-BR" smtClean="0"/>
-              <a:t>10/09/2018</a:t>
+              <a:t>17/09/2018</a:t>
             </a:fld>
             <a:endParaRPr lang="pt-BR"/>
           </a:p>
@@ -10825,7 +11357,7 @@
           <a:p>
             <a:fld id="{3D79C721-C921-4175-8BCF-DFF9FE942864}" type="datetime1">
               <a:rPr lang="pt-BR" smtClean="0"/>
-              <a:t>10/09/2018</a:t>
+              <a:t>17/09/2018</a:t>
             </a:fld>
             <a:endParaRPr lang="pt-BR"/>
           </a:p>
@@ -11294,7 +11826,7 @@
           <a:p>
             <a:fld id="{3D79C721-C921-4175-8BCF-DFF9FE942864}" type="datetime1">
               <a:rPr lang="pt-BR" smtClean="0"/>
-              <a:t>10/09/2018</a:t>
+              <a:t>17/09/2018</a:t>
             </a:fld>
             <a:endParaRPr lang="pt-BR"/>
           </a:p>
@@ -11780,7 +12312,7 @@
           <a:p>
             <a:fld id="{3D79C721-C921-4175-8BCF-DFF9FE942864}" type="datetime1">
               <a:rPr lang="pt-BR" smtClean="0"/>
-              <a:t>10/09/2018</a:t>
+              <a:t>17/09/2018</a:t>
             </a:fld>
             <a:endParaRPr lang="pt-BR"/>
           </a:p>
@@ -12300,19 +12832,11 @@
             </a:r>
             <a:r>
               <a:rPr lang="en-US" dirty="0"/>
-              <a:t> – </a:t>
+              <a:t> – Arrays - </a:t>
             </a:r>
             <a:r>
               <a:rPr lang="en-US" dirty="0" err="1"/>
-              <a:t>Variáveis</a:t>
-            </a:r>
-            <a:r>
-              <a:rPr lang="en-US" dirty="0"/>
-              <a:t> </a:t>
-            </a:r>
-            <a:r>
-              <a:rPr lang="en-US" dirty="0" err="1"/>
-              <a:t>Especiais</a:t>
+              <a:t>Acessando</a:t>
             </a:r>
             <a:endParaRPr lang="es-ES_tradnl" altLang="pt-BR" dirty="0"/>
           </a:p>
@@ -12341,7 +12865,7 @@
           <a:p>
             <a:fld id="{3D79C721-C921-4175-8BCF-DFF9FE942864}" type="datetime1">
               <a:rPr lang="pt-BR" smtClean="0"/>
-              <a:t>10/09/2018</a:t>
+              <a:t>17/09/2018</a:t>
             </a:fld>
             <a:endParaRPr lang="pt-BR"/>
           </a:p>
@@ -12419,7 +12943,7 @@
         <p:spPr>
           <a:xfrm>
             <a:off x="642938" y="1328962"/>
-            <a:ext cx="11044238" cy="4401205"/>
+            <a:ext cx="11044238" cy="5201424"/>
           </a:xfrm>
           <a:prstGeom prst="rect">
             <a:avLst/>
@@ -12437,7 +12961,7 @@
             </a:pPr>
             <a:r>
               <a:rPr lang="en-US" sz="3200" b="1" dirty="0"/>
-              <a:t>$_GET</a:t>
+              <a:t>Arrays</a:t>
             </a:r>
           </a:p>
           <a:p>
@@ -12460,22 +12984,65 @@
                 <a:latin typeface="Courier New" panose="02070309020205020404" pitchFamily="49" charset="0"/>
                 <a:cs typeface="Courier New" panose="02070309020205020404" pitchFamily="49" charset="0"/>
               </a:rPr>
-              <a:t>   $</a:t>
+              <a:t>   $lista </a:t>
+            </a:r>
+            <a:r>
+              <a:rPr lang="en-US" sz="2400" b="1" dirty="0">
+                <a:solidFill>
+                  <a:srgbClr val="6600FF"/>
+                </a:solidFill>
+                <a:latin typeface="Courier New" panose="02070309020205020404" pitchFamily="49" charset="0"/>
+                <a:cs typeface="Courier New" panose="02070309020205020404" pitchFamily="49" charset="0"/>
+              </a:rPr>
+              <a:t>= array(1, 2, 3, 4);</a:t>
+            </a:r>
+          </a:p>
+          <a:p>
+            <a:pPr lvl="1"/>
+            <a:endParaRPr lang="en-US" sz="2400" b="1" dirty="0">
+              <a:solidFill>
+                <a:srgbClr val="6600FF"/>
+              </a:solidFill>
+              <a:latin typeface="Courier New" panose="02070309020205020404" pitchFamily="49" charset="0"/>
+              <a:cs typeface="Courier New" panose="02070309020205020404" pitchFamily="49" charset="0"/>
+            </a:endParaRPr>
+          </a:p>
+          <a:p>
+            <a:pPr lvl="1"/>
+            <a:r>
+              <a:rPr lang="en-US" sz="2400" b="1" dirty="0">
+                <a:latin typeface="Courier New" panose="02070309020205020404" pitchFamily="49" charset="0"/>
+                <a:cs typeface="Courier New" panose="02070309020205020404" pitchFamily="49" charset="0"/>
+              </a:rPr>
+              <a:t>   echo $lista[0]; // </a:t>
             </a:r>
             <a:r>
               <a:rPr lang="en-US" sz="2400" b="1" dirty="0" err="1">
                 <a:latin typeface="Courier New" panose="02070309020205020404" pitchFamily="49" charset="0"/>
                 <a:cs typeface="Courier New" panose="02070309020205020404" pitchFamily="49" charset="0"/>
               </a:rPr>
-              <a:t>nomeFuncionario</a:t>
+              <a:t>Imprime</a:t>
             </a:r>
             <a:r>
               <a:rPr lang="en-US" sz="2400" b="1" dirty="0">
                 <a:latin typeface="Courier New" panose="02070309020205020404" pitchFamily="49" charset="0"/>
                 <a:cs typeface="Courier New" panose="02070309020205020404" pitchFamily="49" charset="0"/>
               </a:rPr>
-              <a:t> </a:t>
-            </a:r>
+              <a:t> “1”</a:t>
+            </a:r>
+          </a:p>
+          <a:p>
+            <a:pPr lvl="1"/>
+            <a:endParaRPr lang="en-US" sz="2400" b="1" dirty="0">
+              <a:solidFill>
+                <a:srgbClr val="6600FF"/>
+              </a:solidFill>
+              <a:latin typeface="Courier New" panose="02070309020205020404" pitchFamily="49" charset="0"/>
+              <a:cs typeface="Courier New" panose="02070309020205020404" pitchFamily="49" charset="0"/>
+            </a:endParaRPr>
+          </a:p>
+          <a:p>
+            <a:pPr lvl="1"/>
             <a:r>
               <a:rPr lang="en-US" sz="2400" b="1" dirty="0">
                 <a:solidFill>
@@ -12484,8 +13051,210 @@
                 <a:latin typeface="Courier New" panose="02070309020205020404" pitchFamily="49" charset="0"/>
                 <a:cs typeface="Courier New" panose="02070309020205020404" pitchFamily="49" charset="0"/>
               </a:rPr>
-              <a:t>= $_GET[“NOMEFUNC”];</a:t>
-            </a:r>
+              <a:t>   </a:t>
+            </a:r>
+            <a:r>
+              <a:rPr lang="en-US" sz="2400" b="1" dirty="0">
+                <a:latin typeface="Courier New" panose="02070309020205020404" pitchFamily="49" charset="0"/>
+                <a:cs typeface="Courier New" panose="02070309020205020404" pitchFamily="49" charset="0"/>
+              </a:rPr>
+              <a:t>$lista[] = 5; // </a:t>
+            </a:r>
+            <a:r>
+              <a:rPr lang="en-US" sz="2400" b="1" dirty="0" err="1">
+                <a:latin typeface="Courier New" panose="02070309020205020404" pitchFamily="49" charset="0"/>
+                <a:cs typeface="Courier New" panose="02070309020205020404" pitchFamily="49" charset="0"/>
+              </a:rPr>
+              <a:t>Adiciona</a:t>
+            </a:r>
+            <a:r>
+              <a:rPr lang="en-US" sz="2400" b="1" dirty="0">
+                <a:latin typeface="Courier New" panose="02070309020205020404" pitchFamily="49" charset="0"/>
+                <a:cs typeface="Courier New" panose="02070309020205020404" pitchFamily="49" charset="0"/>
+              </a:rPr>
+              <a:t> a última posicao </a:t>
+            </a:r>
+            <a:r>
+              <a:rPr lang="en-US" sz="2400" b="1">
+                <a:latin typeface="Courier New" panose="02070309020205020404" pitchFamily="49" charset="0"/>
+                <a:cs typeface="Courier New" panose="02070309020205020404" pitchFamily="49" charset="0"/>
+              </a:rPr>
+              <a:t>do Array</a:t>
+            </a:r>
+          </a:p>
+          <a:p>
+            <a:pPr lvl="1"/>
+            <a:endParaRPr lang="en-US" sz="2400" b="1" u="sng" dirty="0">
+              <a:solidFill>
+                <a:srgbClr val="6600FF"/>
+              </a:solidFill>
+              <a:latin typeface="Courier New" panose="02070309020205020404" pitchFamily="49" charset="0"/>
+              <a:cs typeface="Courier New" panose="02070309020205020404" pitchFamily="49" charset="0"/>
+            </a:endParaRPr>
+          </a:p>
+          <a:p>
+            <a:pPr lvl="1"/>
+            <a:r>
+              <a:rPr lang="en-US" sz="2400" b="1" dirty="0">
+                <a:solidFill>
+                  <a:srgbClr val="6600FF"/>
+                </a:solidFill>
+                <a:latin typeface="Courier New" panose="02070309020205020404" pitchFamily="49" charset="0"/>
+                <a:cs typeface="Courier New" panose="02070309020205020404" pitchFamily="49" charset="0"/>
+              </a:rPr>
+              <a:t>   count(</a:t>
+            </a:r>
+            <a:r>
+              <a:rPr lang="en-US" sz="2400" b="1" dirty="0">
+                <a:latin typeface="Courier New" panose="02070309020205020404" pitchFamily="49" charset="0"/>
+                <a:cs typeface="Courier New" panose="02070309020205020404" pitchFamily="49" charset="0"/>
+              </a:rPr>
+              <a:t>$lista</a:t>
+            </a:r>
+            <a:r>
+              <a:rPr lang="en-US" sz="2400" b="1" dirty="0">
+                <a:solidFill>
+                  <a:srgbClr val="6600FF"/>
+                </a:solidFill>
+                <a:latin typeface="Courier New" panose="02070309020205020404" pitchFamily="49" charset="0"/>
+                <a:cs typeface="Courier New" panose="02070309020205020404" pitchFamily="49" charset="0"/>
+              </a:rPr>
+              <a:t>) </a:t>
+            </a:r>
+            <a:r>
+              <a:rPr lang="en-US" sz="2400" b="1" dirty="0">
+                <a:latin typeface="Courier New" panose="02070309020205020404" pitchFamily="49" charset="0"/>
+                <a:cs typeface="Courier New" panose="02070309020205020404" pitchFamily="49" charset="0"/>
+              </a:rPr>
+              <a:t>// </a:t>
+            </a:r>
+            <a:r>
+              <a:rPr lang="en-US" sz="2400" b="1" dirty="0" err="1">
+                <a:latin typeface="Courier New" panose="02070309020205020404" pitchFamily="49" charset="0"/>
+                <a:cs typeface="Courier New" panose="02070309020205020404" pitchFamily="49" charset="0"/>
+              </a:rPr>
+              <a:t>Número</a:t>
+            </a:r>
+            <a:r>
+              <a:rPr lang="en-US" sz="2400" b="1" dirty="0">
+                <a:latin typeface="Courier New" panose="02070309020205020404" pitchFamily="49" charset="0"/>
+                <a:cs typeface="Courier New" panose="02070309020205020404" pitchFamily="49" charset="0"/>
+              </a:rPr>
+              <a:t> de </a:t>
+            </a:r>
+            <a:r>
+              <a:rPr lang="en-US" sz="2400" b="1" dirty="0" err="1">
+                <a:latin typeface="Courier New" panose="02070309020205020404" pitchFamily="49" charset="0"/>
+                <a:cs typeface="Courier New" panose="02070309020205020404" pitchFamily="49" charset="0"/>
+              </a:rPr>
+              <a:t>elementos</a:t>
+            </a:r>
+            <a:r>
+              <a:rPr lang="en-US" sz="2400" b="1" dirty="0">
+                <a:latin typeface="Courier New" panose="02070309020205020404" pitchFamily="49" charset="0"/>
+                <a:cs typeface="Courier New" panose="02070309020205020404" pitchFamily="49" charset="0"/>
+              </a:rPr>
+              <a:t> do Array</a:t>
+            </a:r>
+          </a:p>
+          <a:p>
+            <a:pPr lvl="1"/>
+            <a:r>
+              <a:rPr lang="en-US" sz="2400" b="1" dirty="0">
+                <a:solidFill>
+                  <a:srgbClr val="6600FF"/>
+                </a:solidFill>
+                <a:latin typeface="Courier New" panose="02070309020205020404" pitchFamily="49" charset="0"/>
+                <a:cs typeface="Courier New" panose="02070309020205020404" pitchFamily="49" charset="0"/>
+              </a:rPr>
+              <a:t>    </a:t>
+            </a:r>
+          </a:p>
+          <a:p>
+            <a:pPr lvl="1"/>
+            <a:r>
+              <a:rPr lang="en-US" sz="3600" b="1" dirty="0">
+                <a:solidFill>
+                  <a:srgbClr val="6600FF"/>
+                </a:solidFill>
+                <a:latin typeface="Courier New" panose="02070309020205020404" pitchFamily="49" charset="0"/>
+                <a:cs typeface="Courier New" panose="02070309020205020404" pitchFamily="49" charset="0"/>
+              </a:rPr>
+              <a:t>   </a:t>
+            </a:r>
+            <a:r>
+              <a:rPr lang="en-US" sz="3600" b="1" dirty="0">
+                <a:latin typeface="Courier New" panose="02070309020205020404" pitchFamily="49" charset="0"/>
+                <a:cs typeface="Courier New" panose="02070309020205020404" pitchFamily="49" charset="0"/>
+              </a:rPr>
+              <a:t>$&lt;</a:t>
+            </a:r>
+            <a:r>
+              <a:rPr lang="en-US" sz="3600" i="1" dirty="0">
+                <a:latin typeface="Arial" panose="020B0604020202020204" pitchFamily="34" charset="0"/>
+                <a:cs typeface="Arial" panose="020B0604020202020204" pitchFamily="34" charset="0"/>
+              </a:rPr>
+              <a:t>Array</a:t>
+            </a:r>
+            <a:r>
+              <a:rPr lang="en-US" sz="3600" b="1" dirty="0">
+                <a:latin typeface="Courier New" panose="02070309020205020404" pitchFamily="49" charset="0"/>
+                <a:cs typeface="Courier New" panose="02070309020205020404" pitchFamily="49" charset="0"/>
+              </a:rPr>
+              <a:t>&gt;[&lt;</a:t>
+            </a:r>
+            <a:r>
+              <a:rPr lang="en-US" sz="3600" i="1" dirty="0" err="1">
+                <a:latin typeface="Arial" panose="020B0604020202020204" pitchFamily="34" charset="0"/>
+                <a:cs typeface="Arial" panose="020B0604020202020204" pitchFamily="34" charset="0"/>
+              </a:rPr>
+              <a:t>Indice</a:t>
+            </a:r>
+            <a:r>
+              <a:rPr lang="en-US" sz="3600" b="1" dirty="0">
+                <a:latin typeface="Courier New" panose="02070309020205020404" pitchFamily="49" charset="0"/>
+                <a:cs typeface="Courier New" panose="02070309020205020404" pitchFamily="49" charset="0"/>
+              </a:rPr>
+              <a:t>&gt;] = &lt;</a:t>
+            </a:r>
+            <a:r>
+              <a:rPr lang="en-US" sz="3600" i="1" dirty="0">
+                <a:latin typeface="Arial" panose="020B0604020202020204" pitchFamily="34" charset="0"/>
+                <a:cs typeface="Arial" panose="020B0604020202020204" pitchFamily="34" charset="0"/>
+              </a:rPr>
+              <a:t>Valor do </a:t>
+            </a:r>
+            <a:r>
+              <a:rPr lang="en-US" sz="3600" i="1" dirty="0" err="1">
+                <a:latin typeface="Arial" panose="020B0604020202020204" pitchFamily="34" charset="0"/>
+                <a:cs typeface="Arial" panose="020B0604020202020204" pitchFamily="34" charset="0"/>
+              </a:rPr>
+              <a:t>indice</a:t>
+            </a:r>
+            <a:r>
+              <a:rPr lang="en-US" sz="3600" b="1" dirty="0">
+                <a:latin typeface="Courier New" panose="02070309020205020404" pitchFamily="49" charset="0"/>
+                <a:cs typeface="Courier New" panose="02070309020205020404" pitchFamily="49" charset="0"/>
+              </a:rPr>
+              <a:t>&gt;;</a:t>
+            </a:r>
+            <a:endParaRPr lang="en-US" sz="3600" b="1" dirty="0">
+              <a:solidFill>
+                <a:srgbClr val="6600FF"/>
+              </a:solidFill>
+              <a:latin typeface="Courier New" panose="02070309020205020404" pitchFamily="49" charset="0"/>
+              <a:cs typeface="Courier New" panose="02070309020205020404" pitchFamily="49" charset="0"/>
+            </a:endParaRPr>
+          </a:p>
+          <a:p>
+            <a:pPr lvl="1"/>
+            <a:endParaRPr lang="en-US" sz="2400" b="1" dirty="0">
+              <a:solidFill>
+                <a:srgbClr val="6600FF"/>
+              </a:solidFill>
+              <a:latin typeface="Courier New" panose="02070309020205020404" pitchFamily="49" charset="0"/>
+              <a:cs typeface="Courier New" panose="02070309020205020404" pitchFamily="49" charset="0"/>
+            </a:endParaRPr>
           </a:p>
           <a:p>
             <a:pPr lvl="1"/>
@@ -12504,137 +13273,12 @@
               <a:cs typeface="Courier New" panose="02070309020205020404" pitchFamily="49" charset="0"/>
             </a:endParaRPr>
           </a:p>
-          <a:p>
-            <a:r>
-              <a:rPr lang="en-US" sz="2400" dirty="0">
-                <a:latin typeface="Courier New" panose="02070309020205020404" pitchFamily="49" charset="0"/>
-                <a:cs typeface="Courier New" panose="02070309020205020404" pitchFamily="49" charset="0"/>
-              </a:rPr>
-              <a:t>	Ex:  </a:t>
-            </a:r>
-            <a:r>
-              <a:rPr lang="en-US" sz="2400" dirty="0">
-                <a:latin typeface="Courier New" panose="02070309020205020404" pitchFamily="49" charset="0"/>
-                <a:cs typeface="Courier New" panose="02070309020205020404" pitchFamily="49" charset="0"/>
-                <a:hlinkClick r:id="rId3"/>
-              </a:rPr>
-              <a:t>http://localhost/tste.php?</a:t>
-            </a:r>
-            <a:r>
-              <a:rPr lang="en-US" sz="2400" b="1" dirty="0">
-                <a:solidFill>
-                  <a:srgbClr val="6600FF"/>
-                </a:solidFill>
-                <a:latin typeface="Courier New" panose="02070309020205020404" pitchFamily="49" charset="0"/>
-                <a:cs typeface="Courier New" panose="02070309020205020404" pitchFamily="49" charset="0"/>
-                <a:hlinkClick r:id="rId3"/>
-              </a:rPr>
-              <a:t>NOMEFUNC</a:t>
-            </a:r>
-            <a:r>
-              <a:rPr lang="en-US" sz="2400" dirty="0">
-                <a:latin typeface="Courier New" panose="02070309020205020404" pitchFamily="49" charset="0"/>
-                <a:cs typeface="Courier New" panose="02070309020205020404" pitchFamily="49" charset="0"/>
-                <a:hlinkClick r:id="rId3"/>
-              </a:rPr>
-              <a:t>=Andre</a:t>
-            </a:r>
-            <a:endParaRPr lang="en-US" sz="2400" dirty="0">
-              <a:latin typeface="Courier New" panose="02070309020205020404" pitchFamily="49" charset="0"/>
-              <a:cs typeface="Courier New" panose="02070309020205020404" pitchFamily="49" charset="0"/>
-            </a:endParaRPr>
-          </a:p>
-          <a:p>
-            <a:endParaRPr lang="en-US" sz="2400" dirty="0">
-              <a:latin typeface="Courier New" panose="02070309020205020404" pitchFamily="49" charset="0"/>
-              <a:cs typeface="Courier New" panose="02070309020205020404" pitchFamily="49" charset="0"/>
-            </a:endParaRPr>
-          </a:p>
-          <a:p>
-            <a:pPr marL="285750" indent="-285750">
-              <a:buFont typeface="Arial" panose="020B0604020202020204" pitchFamily="34" charset="0"/>
-              <a:buChar char="•"/>
-            </a:pPr>
-            <a:r>
-              <a:rPr lang="en-US" sz="3200" b="1" dirty="0"/>
-              <a:t>$_POST </a:t>
-            </a:r>
-            <a:r>
-              <a:rPr lang="en-US" sz="3200" dirty="0"/>
-              <a:t>– </a:t>
-            </a:r>
-            <a:r>
-              <a:rPr lang="en-US" sz="3200" dirty="0" err="1"/>
-              <a:t>Usado</a:t>
-            </a:r>
-            <a:r>
-              <a:rPr lang="en-US" sz="3200" dirty="0"/>
-              <a:t> com </a:t>
-            </a:r>
-            <a:r>
-              <a:rPr lang="en-US" sz="3200" dirty="0" err="1"/>
-              <a:t>chamadas</a:t>
-            </a:r>
-            <a:r>
-              <a:rPr lang="en-US" sz="3200" dirty="0"/>
-              <a:t> “POST”</a:t>
-            </a:r>
-          </a:p>
-          <a:p>
-            <a:pPr marL="285750" indent="-285750">
-              <a:buFont typeface="Arial" panose="020B0604020202020204" pitchFamily="34" charset="0"/>
-              <a:buChar char="•"/>
-            </a:pPr>
-            <a:endParaRPr lang="en-US" sz="3200" dirty="0"/>
-          </a:p>
-          <a:p>
-            <a:pPr marL="285750" indent="-285750">
-              <a:buFont typeface="Arial" panose="020B0604020202020204" pitchFamily="34" charset="0"/>
-              <a:buChar char="•"/>
-            </a:pPr>
-            <a:r>
-              <a:rPr lang="en-US" sz="3200" b="1" dirty="0"/>
-              <a:t>$_REQUEST </a:t>
-            </a:r>
-            <a:r>
-              <a:rPr lang="en-US" sz="3200" dirty="0"/>
-              <a:t>– </a:t>
-            </a:r>
-            <a:r>
-              <a:rPr lang="en-US" sz="3200" dirty="0" err="1"/>
-              <a:t>Usado</a:t>
-            </a:r>
-            <a:r>
-              <a:rPr lang="en-US" sz="3200" dirty="0"/>
-              <a:t> para </a:t>
-            </a:r>
-            <a:r>
-              <a:rPr lang="en-US" sz="3200" dirty="0" err="1"/>
-              <a:t>ambas</a:t>
-            </a:r>
-            <a:r>
-              <a:rPr lang="en-US" sz="3200" dirty="0"/>
-              <a:t> as </a:t>
-            </a:r>
-            <a:r>
-              <a:rPr lang="en-US" sz="3200" dirty="0" err="1"/>
-              <a:t>chamadas</a:t>
-            </a:r>
-            <a:endParaRPr lang="en-US" sz="3200" dirty="0"/>
-          </a:p>
-          <a:p>
-            <a:pPr marL="285750" indent="-285750">
-              <a:buFont typeface="Arial" panose="020B0604020202020204" pitchFamily="34" charset="0"/>
-              <a:buChar char="•"/>
-            </a:pPr>
-            <a:endParaRPr lang="en-US" sz="3200" b="1" dirty="0"/>
-          </a:p>
         </p:txBody>
       </p:sp>
     </p:spTree>
     <p:extLst>
       <p:ext uri="{BB962C8B-B14F-4D97-AF65-F5344CB8AC3E}">
-        <p14:creationId xmlns:p14="http://schemas.microsoft.com/office/powerpoint/2010/main" val="2157290014"/>
+        <p14:creationId xmlns:p14="http://schemas.microsoft.com/office/powerpoint/2010/main" val="2305954993"/>
       </p:ext>
     </p:extLst>
   </p:cSld>

</xml_diff>